<commit_message>
Update documentations to reflect change
</commit_message>
<xml_diff>
--- a/docs/diagrams/KeyListenerDiagram.pptx
+++ b/docs/diagrams/KeyListenerDiagram.pptx
@@ -126,6 +126,10 @@
 </p:presentation>
 </file>
 
+<file path=ppt/revisionInfo.xml><?xml version="1.0" encoding="utf-8"?>
+<p1510:revInfo xmlns:a="http://schemas.openxmlformats.org/drawingml/2006/main" xmlns:r="http://schemas.openxmlformats.org/officeDocument/2006/relationships" xmlns:p1510="http://schemas.microsoft.com/office/powerpoint/2015/10/main"/>
+</file>
+
 <file path=ppt/notesMasters/notesMaster1.xml><?xml version="1.0" encoding="utf-8"?>
 <p:notesMaster xmlns:a="http://schemas.openxmlformats.org/drawingml/2006/main" xmlns:r="http://schemas.openxmlformats.org/officeDocument/2006/relationships" xmlns:p="http://schemas.openxmlformats.org/presentationml/2006/main">
   <p:cSld>
@@ -208,7 +212,7 @@
           <a:p>
             <a:fld id="{F5CC4B3F-88C1-4FFA-B1B6-F41C21DC6924}" type="datetimeFigureOut">
               <a:rPr lang="en-US" smtClean="0"/>
-              <a:t>10/19/2017</a:t>
+              <a:t>10/21/2017</a:t>
             </a:fld>
             <a:endParaRPr lang="en-US"/>
           </a:p>
@@ -654,7 +658,7 @@
           <a:p>
             <a:fld id="{78C97017-6FC3-485B-9764-EAC9E56C1D49}" type="datetimeFigureOut">
               <a:rPr lang="en-US" smtClean="0"/>
-              <a:t>10/19/2017</a:t>
+              <a:t>10/21/2017</a:t>
             </a:fld>
             <a:endParaRPr lang="en-US"/>
           </a:p>
@@ -822,7 +826,7 @@
           <a:p>
             <a:fld id="{78C97017-6FC3-485B-9764-EAC9E56C1D49}" type="datetimeFigureOut">
               <a:rPr lang="en-US" smtClean="0"/>
-              <a:t>10/19/2017</a:t>
+              <a:t>10/21/2017</a:t>
             </a:fld>
             <a:endParaRPr lang="en-US"/>
           </a:p>
@@ -1000,7 +1004,7 @@
           <a:p>
             <a:fld id="{78C97017-6FC3-485B-9764-EAC9E56C1D49}" type="datetimeFigureOut">
               <a:rPr lang="en-US" smtClean="0"/>
-              <a:t>10/19/2017</a:t>
+              <a:t>10/21/2017</a:t>
             </a:fld>
             <a:endParaRPr lang="en-US"/>
           </a:p>
@@ -1168,7 +1172,7 @@
           <a:p>
             <a:fld id="{78C97017-6FC3-485B-9764-EAC9E56C1D49}" type="datetimeFigureOut">
               <a:rPr lang="en-US" smtClean="0"/>
-              <a:t>10/19/2017</a:t>
+              <a:t>10/21/2017</a:t>
             </a:fld>
             <a:endParaRPr lang="en-US"/>
           </a:p>
@@ -1413,7 +1417,7 @@
           <a:p>
             <a:fld id="{78C97017-6FC3-485B-9764-EAC9E56C1D49}" type="datetimeFigureOut">
               <a:rPr lang="en-US" smtClean="0"/>
-              <a:t>10/19/2017</a:t>
+              <a:t>10/21/2017</a:t>
             </a:fld>
             <a:endParaRPr lang="en-US"/>
           </a:p>
@@ -1698,7 +1702,7 @@
           <a:p>
             <a:fld id="{78C97017-6FC3-485B-9764-EAC9E56C1D49}" type="datetimeFigureOut">
               <a:rPr lang="en-US" smtClean="0"/>
-              <a:t>10/19/2017</a:t>
+              <a:t>10/21/2017</a:t>
             </a:fld>
             <a:endParaRPr lang="en-US"/>
           </a:p>
@@ -2117,7 +2121,7 @@
           <a:p>
             <a:fld id="{78C97017-6FC3-485B-9764-EAC9E56C1D49}" type="datetimeFigureOut">
               <a:rPr lang="en-US" smtClean="0"/>
-              <a:t>10/19/2017</a:t>
+              <a:t>10/21/2017</a:t>
             </a:fld>
             <a:endParaRPr lang="en-US"/>
           </a:p>
@@ -2234,7 +2238,7 @@
           <a:p>
             <a:fld id="{78C97017-6FC3-485B-9764-EAC9E56C1D49}" type="datetimeFigureOut">
               <a:rPr lang="en-US" smtClean="0"/>
-              <a:t>10/19/2017</a:t>
+              <a:t>10/21/2017</a:t>
             </a:fld>
             <a:endParaRPr lang="en-US"/>
           </a:p>
@@ -2329,7 +2333,7 @@
           <a:p>
             <a:fld id="{78C97017-6FC3-485B-9764-EAC9E56C1D49}" type="datetimeFigureOut">
               <a:rPr lang="en-US" smtClean="0"/>
-              <a:t>10/19/2017</a:t>
+              <a:t>10/21/2017</a:t>
             </a:fld>
             <a:endParaRPr lang="en-US"/>
           </a:p>
@@ -2604,7 +2608,7 @@
           <a:p>
             <a:fld id="{78C97017-6FC3-485B-9764-EAC9E56C1D49}" type="datetimeFigureOut">
               <a:rPr lang="en-US" smtClean="0"/>
-              <a:t>10/19/2017</a:t>
+              <a:t>10/21/2017</a:t>
             </a:fld>
             <a:endParaRPr lang="en-US"/>
           </a:p>
@@ -2856,7 +2860,7 @@
           <a:p>
             <a:fld id="{78C97017-6FC3-485B-9764-EAC9E56C1D49}" type="datetimeFigureOut">
               <a:rPr lang="en-US" smtClean="0"/>
-              <a:t>10/19/2017</a:t>
+              <a:t>10/21/2017</a:t>
             </a:fld>
             <a:endParaRPr lang="en-US"/>
           </a:p>
@@ -3067,7 +3071,7 @@
           <a:p>
             <a:fld id="{78C97017-6FC3-485B-9764-EAC9E56C1D49}" type="datetimeFigureOut">
               <a:rPr lang="en-US" smtClean="0"/>
-              <a:t>10/19/2017</a:t>
+              <a:t>10/21/2017</a:t>
             </a:fld>
             <a:endParaRPr lang="en-US"/>
           </a:p>
@@ -4286,6 +4290,65 @@
           </a:fontRef>
         </p:style>
       </p:cxnSp>
+      <p:sp>
+        <p:nvSpPr>
+          <p:cNvPr id="282" name="Rectangle 281">
+            <a:extLst>
+              <a:ext uri="{FF2B5EF4-FFF2-40B4-BE49-F238E27FC236}">
+                <a16:creationId xmlns:a16="http://schemas.microsoft.com/office/drawing/2014/main" id="{23BDF593-3F49-4BB6-8F10-69DF04E12E17}"/>
+              </a:ext>
+            </a:extLst>
+          </p:cNvPr>
+          <p:cNvSpPr/>
+          <p:nvPr/>
+        </p:nvSpPr>
+        <p:spPr>
+          <a:xfrm>
+            <a:off x="4114800" y="2713934"/>
+            <a:ext cx="108049" cy="160062"/>
+          </a:xfrm>
+          <a:prstGeom prst="rect">
+            <a:avLst/>
+          </a:prstGeom>
+          <a:solidFill>
+            <a:schemeClr val="accent3">
+              <a:lumMod val="20000"/>
+              <a:lumOff val="80000"/>
+              <a:alpha val="80000"/>
+            </a:schemeClr>
+          </a:solidFill>
+          <a:ln>
+            <a:noFill/>
+          </a:ln>
+          <a:effectLst>
+            <a:softEdge rad="31750"/>
+          </a:effectLst>
+        </p:spPr>
+        <p:style>
+          <a:lnRef idx="2">
+            <a:schemeClr val="accent1">
+              <a:shade val="50000"/>
+            </a:schemeClr>
+          </a:lnRef>
+          <a:fillRef idx="1">
+            <a:schemeClr val="accent1"/>
+          </a:fillRef>
+          <a:effectRef idx="0">
+            <a:schemeClr val="accent1"/>
+          </a:effectRef>
+          <a:fontRef idx="minor">
+            <a:schemeClr val="lt1"/>
+          </a:fontRef>
+        </p:style>
+        <p:txBody>
+          <a:bodyPr rtlCol="0" anchor="ctr"/>
+          <a:lstStyle/>
+          <a:p>
+            <a:pPr algn="ctr"/>
+            <a:endParaRPr lang="en-SG"/>
+          </a:p>
+        </p:txBody>
+      </p:sp>
       <p:cxnSp>
         <p:nvCxnSpPr>
           <p:cNvPr id="97" name="Elbow Connector 63">
@@ -4386,153 +4449,6 @@
           </a:fontRef>
         </p:style>
       </p:cxnSp>
-      <p:sp>
-        <p:nvSpPr>
-          <p:cNvPr id="282" name="Rectangle 281">
-            <a:extLst>
-              <a:ext uri="{FF2B5EF4-FFF2-40B4-BE49-F238E27FC236}">
-                <a16:creationId xmlns:a16="http://schemas.microsoft.com/office/drawing/2014/main" id="{23BDF593-3F49-4BB6-8F10-69DF04E12E17}"/>
-              </a:ext>
-            </a:extLst>
-          </p:cNvPr>
-          <p:cNvSpPr/>
-          <p:nvPr/>
-        </p:nvSpPr>
-        <p:spPr>
-          <a:xfrm>
-            <a:off x="4040813" y="2713934"/>
-            <a:ext cx="229325" cy="160062"/>
-          </a:xfrm>
-          <a:prstGeom prst="rect">
-            <a:avLst/>
-          </a:prstGeom>
-          <a:solidFill>
-            <a:schemeClr val="accent3">
-              <a:lumMod val="20000"/>
-              <a:lumOff val="80000"/>
-              <a:alpha val="80000"/>
-            </a:schemeClr>
-          </a:solidFill>
-          <a:ln>
-            <a:noFill/>
-          </a:ln>
-          <a:effectLst>
-            <a:softEdge rad="31750"/>
-          </a:effectLst>
-        </p:spPr>
-        <p:style>
-          <a:lnRef idx="2">
-            <a:schemeClr val="accent1">
-              <a:shade val="50000"/>
-            </a:schemeClr>
-          </a:lnRef>
-          <a:fillRef idx="1">
-            <a:schemeClr val="accent1"/>
-          </a:fillRef>
-          <a:effectRef idx="0">
-            <a:schemeClr val="accent1"/>
-          </a:effectRef>
-          <a:fontRef idx="minor">
-            <a:schemeClr val="lt1"/>
-          </a:fontRef>
-        </p:style>
-        <p:txBody>
-          <a:bodyPr rtlCol="0" anchor="ctr"/>
-          <a:lstStyle/>
-          <a:p>
-            <a:pPr algn="ctr"/>
-            <a:endParaRPr lang="en-SG"/>
-          </a:p>
-        </p:txBody>
-      </p:sp>
-      <p:sp>
-        <p:nvSpPr>
-          <p:cNvPr id="136" name="Freeform 115">
-            <a:extLst>
-              <a:ext uri="{FF2B5EF4-FFF2-40B4-BE49-F238E27FC236}">
-                <a16:creationId xmlns:a16="http://schemas.microsoft.com/office/drawing/2014/main" id="{E2EAF977-0581-4827-AD10-89E479981F20}"/>
-              </a:ext>
-            </a:extLst>
-          </p:cNvPr>
-          <p:cNvSpPr/>
-          <p:nvPr/>
-        </p:nvSpPr>
-        <p:spPr>
-          <a:xfrm flipV="1">
-            <a:off x="3215409" y="2555741"/>
-            <a:ext cx="3256502" cy="225562"/>
-          </a:xfrm>
-          <a:custGeom>
-            <a:avLst/>
-            <a:gdLst>
-              <a:gd name="connsiteX0" fmla="*/ 0 w 3048000"/>
-              <a:gd name="connsiteY0" fmla="*/ 203200 h 203200"/>
-              <a:gd name="connsiteX1" fmla="*/ 221673 w 3048000"/>
-              <a:gd name="connsiteY1" fmla="*/ 0 h 203200"/>
-              <a:gd name="connsiteX2" fmla="*/ 3048000 w 3048000"/>
-              <a:gd name="connsiteY2" fmla="*/ 0 h 203200"/>
-            </a:gdLst>
-            <a:ahLst/>
-            <a:cxnLst>
-              <a:cxn ang="0">
-                <a:pos x="connsiteX0" y="connsiteY0"/>
-              </a:cxn>
-              <a:cxn ang="0">
-                <a:pos x="connsiteX1" y="connsiteY1"/>
-              </a:cxn>
-              <a:cxn ang="0">
-                <a:pos x="connsiteX2" y="connsiteY2"/>
-              </a:cxn>
-            </a:cxnLst>
-            <a:rect l="l" t="t" r="r" b="b"/>
-            <a:pathLst>
-              <a:path w="3048000" h="203200">
-                <a:moveTo>
-                  <a:pt x="0" y="203200"/>
-                </a:moveTo>
-                <a:lnTo>
-                  <a:pt x="221673" y="0"/>
-                </a:lnTo>
-                <a:lnTo>
-                  <a:pt x="3048000" y="0"/>
-                </a:lnTo>
-              </a:path>
-            </a:pathLst>
-          </a:custGeom>
-          <a:noFill/>
-          <a:ln w="19050">
-            <a:solidFill>
-              <a:schemeClr val="accent3"/>
-            </a:solidFill>
-            <a:prstDash val="solid"/>
-            <a:headEnd type="none" w="med" len="med"/>
-            <a:tailEnd type="arrow" w="med" len="med"/>
-          </a:ln>
-          <a:effectLst/>
-        </p:spPr>
-        <p:style>
-          <a:lnRef idx="1">
-            <a:schemeClr val="accent2"/>
-          </a:lnRef>
-          <a:fillRef idx="2">
-            <a:schemeClr val="accent2"/>
-          </a:fillRef>
-          <a:effectRef idx="1">
-            <a:schemeClr val="accent2"/>
-          </a:effectRef>
-          <a:fontRef idx="minor">
-            <a:schemeClr val="dk1"/>
-          </a:fontRef>
-        </p:style>
-        <p:txBody>
-          <a:bodyPr rtlCol="0" anchor="ctr"/>
-          <a:lstStyle/>
-          <a:p>
-            <a:pPr algn="ctr"/>
-            <a:endParaRPr lang="en-SG"/>
-          </a:p>
-        </p:txBody>
-      </p:sp>
     </p:spTree>
     <p:extLst>
       <p:ext uri="{BB962C8B-B14F-4D97-AF65-F5344CB8AC3E}">

</xml_diff>